<commit_message>
Cleanup notebooks and avoid depr. warning in 3.py
</commit_message>
<xml_diff>
--- a/NFL_Linear_Regression.pptx.pptx
+++ b/NFL_Linear_Regression.pptx.pptx
@@ -5,7 +5,7 @@
     <p:sldMasterId id="2147483648" r:id="rId1"/>
   </p:sldMasterIdLst>
   <p:notesMasterIdLst>
-    <p:notesMasterId r:id="rId9"/>
+    <p:notesMasterId r:id="rId10"/>
   </p:notesMasterIdLst>
   <p:sldIdLst>
     <p:sldId id="256" r:id="rId2"/>
@@ -15,6 +15,7 @@
     <p:sldId id="263" r:id="rId6"/>
     <p:sldId id="264" r:id="rId7"/>
     <p:sldId id="265" r:id="rId8"/>
+    <p:sldId id="266" r:id="rId9"/>
   </p:sldIdLst>
   <p:sldSz cx="12192000" cy="6858000"/>
   <p:notesSz cx="6858000" cy="9144000"/>
@@ -113,6 +114,11 @@
       </a:defRPr>
     </a:lvl9pPr>
   </p:defaultTextStyle>
+  <p:extLst>
+    <p:ext uri="{EFAFB233-063F-42B5-8137-9DF3F51BA10A}">
+      <p15:sldGuideLst xmlns:p15="http://schemas.microsoft.com/office/powerpoint/2012/main"/>
+    </p:ext>
+  </p:extLst>
 </p:presentation>
 </file>
 
@@ -198,7 +204,7 @@
           <a:p>
             <a:fld id="{EE0ED957-FCDE-F842-8DBC-2764BBD645FC}" type="datetimeFigureOut">
               <a:rPr lang="en-US" smtClean="0"/>
-              <a:t>1/21/21</a:t>
+              <a:t>1/22/21</a:t>
             </a:fld>
             <a:endParaRPr lang="en-US"/>
           </a:p>
@@ -819,7 +825,7 @@
           <a:p>
             <a:fld id="{D3936712-E643-0249-A607-9F80C41463F7}" type="datetime1">
               <a:rPr lang="en-US" smtClean="0"/>
-              <a:t>1/21/21</a:t>
+              <a:t>1/22/21</a:t>
             </a:fld>
             <a:endParaRPr lang="en-US"/>
           </a:p>
@@ -1020,7 +1026,7 @@
           <a:p>
             <a:fld id="{FA99BF63-D395-5A4D-BCCE-E0987FBDFF0C}" type="datetime1">
               <a:rPr lang="en-US" smtClean="0"/>
-              <a:t>1/21/21</a:t>
+              <a:t>1/22/21</a:t>
             </a:fld>
             <a:endParaRPr lang="en-US"/>
           </a:p>
@@ -1231,7 +1237,7 @@
           <a:p>
             <a:fld id="{0C053D60-1DFC-6E4C-8CB4-D828D47C6451}" type="datetime1">
               <a:rPr lang="en-US" smtClean="0"/>
-              <a:t>1/21/21</a:t>
+              <a:t>1/22/21</a:t>
             </a:fld>
             <a:endParaRPr lang="en-US"/>
           </a:p>
@@ -1432,7 +1438,7 @@
           <a:p>
             <a:fld id="{9DD8A945-1056-C94B-8FD2-FBF78D0F8CF5}" type="datetime1">
               <a:rPr lang="en-US" smtClean="0"/>
-              <a:t>1/21/21</a:t>
+              <a:t>1/22/21</a:t>
             </a:fld>
             <a:endParaRPr lang="en-US"/>
           </a:p>
@@ -1710,7 +1716,7 @@
           <a:p>
             <a:fld id="{B3255EB0-98DA-7D4C-9126-BC86672A44F6}" type="datetime1">
               <a:rPr lang="en-US" smtClean="0"/>
-              <a:t>1/21/21</a:t>
+              <a:t>1/22/21</a:t>
             </a:fld>
             <a:endParaRPr lang="en-US"/>
           </a:p>
@@ -1978,7 +1984,7 @@
           <a:p>
             <a:fld id="{1158475A-7F2E-A64D-9414-9639AE38421F}" type="datetime1">
               <a:rPr lang="en-US" smtClean="0"/>
-              <a:t>1/21/21</a:t>
+              <a:t>1/22/21</a:t>
             </a:fld>
             <a:endParaRPr lang="en-US"/>
           </a:p>
@@ -2393,7 +2399,7 @@
           <a:p>
             <a:fld id="{DB46F4FD-F3DD-074E-9FF2-4A919DD63A0B}" type="datetime1">
               <a:rPr lang="en-US" smtClean="0"/>
-              <a:t>1/21/21</a:t>
+              <a:t>1/22/21</a:t>
             </a:fld>
             <a:endParaRPr lang="en-US"/>
           </a:p>
@@ -2537,7 +2543,7 @@
           <a:p>
             <a:fld id="{9B2C54DF-3262-7E4A-983C-94D5EB70ECF1}" type="datetime1">
               <a:rPr lang="en-US" smtClean="0"/>
-              <a:t>1/21/21</a:t>
+              <a:t>1/22/21</a:t>
             </a:fld>
             <a:endParaRPr lang="en-US"/>
           </a:p>
@@ -2653,7 +2659,7 @@
           <a:p>
             <a:fld id="{A8084192-9752-6A49-941F-40090D52467C}" type="datetime1">
               <a:rPr lang="en-US" smtClean="0"/>
-              <a:t>1/21/21</a:t>
+              <a:t>1/22/21</a:t>
             </a:fld>
             <a:endParaRPr lang="en-US"/>
           </a:p>
@@ -2967,7 +2973,7 @@
           <a:p>
             <a:fld id="{B2D4984B-5449-EF45-96A4-2A2C02EF8A4F}" type="datetime1">
               <a:rPr lang="en-US" smtClean="0"/>
-              <a:t>1/21/21</a:t>
+              <a:t>1/22/21</a:t>
             </a:fld>
             <a:endParaRPr lang="en-US"/>
           </a:p>
@@ -3258,7 +3264,7 @@
           <a:p>
             <a:fld id="{C48DA321-A300-3E44-84E1-CC01A6EAF076}" type="datetime1">
               <a:rPr lang="en-US" smtClean="0"/>
-              <a:t>1/21/21</a:t>
+              <a:t>1/22/21</a:t>
             </a:fld>
             <a:endParaRPr lang="en-US"/>
           </a:p>
@@ -3502,7 +3508,7 @@
           <a:p>
             <a:fld id="{49E54772-058A-324D-9B95-130E5B40338C}" type="datetime1">
               <a:rPr lang="en-US" smtClean="0"/>
-              <a:t>1/21/21</a:t>
+              <a:t>1/22/21</a:t>
             </a:fld>
             <a:endParaRPr lang="en-US"/>
           </a:p>
@@ -5189,8 +5195,8 @@
         </p:blipFill>
         <p:spPr bwMode="auto">
           <a:xfrm>
-            <a:off x="183006" y="4898570"/>
-            <a:ext cx="5564310" cy="1879459"/>
+            <a:off x="7661405" y="734421"/>
+            <a:ext cx="4070916" cy="1375035"/>
           </a:xfrm>
           <a:prstGeom prst="rect">
             <a:avLst/>
@@ -5236,7 +5242,7 @@
         </p:blipFill>
         <p:spPr bwMode="auto">
           <a:xfrm>
-            <a:off x="8286750" y="361137"/>
+            <a:off x="7972125" y="2086442"/>
             <a:ext cx="3517746" cy="1893536"/>
           </a:xfrm>
           <a:prstGeom prst="rect">
@@ -5310,7 +5316,7 @@
         <p:spPr>
           <a:xfrm>
             <a:off x="1085850" y="3733800"/>
-            <a:ext cx="7200900" cy="369332"/>
+            <a:ext cx="7537450" cy="1323439"/>
           </a:xfrm>
           <a:prstGeom prst="rect">
             <a:avLst/>
@@ -5324,7 +5330,7 @@
           <a:lstStyle/>
           <a:p>
             <a:r>
-              <a:rPr lang="en-US" dirty="0">
+              <a:rPr lang="en-US" sz="2000" dirty="0">
                 <a:solidFill>
                   <a:srgbClr val="D50A0A"/>
                 </a:solidFill>
@@ -5332,12 +5338,41 @@
               <a:t>All stats gathered from </a:t>
             </a:r>
             <a:r>
-              <a:rPr lang="en-US" b="1" u="sng" dirty="0">
+              <a:rPr lang="en-US" sz="2000" b="1" u="sng" dirty="0">
                 <a:solidFill>
                   <a:srgbClr val="D50A0A"/>
                 </a:solidFill>
               </a:rPr>
               <a:t>pro-football-reference.com</a:t>
+            </a:r>
+            <a:r>
+              <a:rPr lang="en-US" sz="2000" dirty="0">
+                <a:solidFill>
+                  <a:srgbClr val="D50A0A"/>
+                </a:solidFill>
+              </a:rPr>
+              <a:t> via web scraping with BeautifulSoup</a:t>
+            </a:r>
+          </a:p>
+          <a:p>
+            <a:endParaRPr lang="en-US" sz="2000" dirty="0">
+              <a:solidFill>
+                <a:srgbClr val="D50A0A"/>
+              </a:solidFill>
+            </a:endParaRPr>
+          </a:p>
+          <a:p>
+            <a:pPr marL="342900" indent="-342900">
+              <a:buFont typeface="Arial" panose="020B0604020202020204" pitchFamily="34" charset="0"/>
+              <a:buChar char="•"/>
+            </a:pPr>
+            <a:r>
+              <a:rPr lang="en-US" sz="2000" dirty="0">
+                <a:solidFill>
+                  <a:srgbClr val="013369"/>
+                </a:solidFill>
+              </a:rPr>
+              <a:t>11,948 data points (filtered down from 20500)</a:t>
             </a:r>
           </a:p>
         </p:txBody>
@@ -6175,7 +6210,7 @@
         <p:spPr>
           <a:xfrm>
             <a:off x="329295" y="1602769"/>
-            <a:ext cx="5832432" cy="5539978"/>
+            <a:ext cx="5832432" cy="5816977"/>
           </a:xfrm>
           <a:prstGeom prst="rect">
             <a:avLst/>
@@ -6199,6 +6234,21 @@
             </a:r>
           </a:p>
           <a:p>
+            <a:pPr marL="285750" indent="-285750">
+              <a:buFont typeface="Arial" panose="020B0604020202020204" pitchFamily="34" charset="0"/>
+              <a:buChar char="•"/>
+            </a:pPr>
+            <a:r>
+              <a:rPr lang="en-US" dirty="0">
+                <a:solidFill>
+                  <a:srgbClr val="013369"/>
+                </a:solidFill>
+                <a:latin typeface="Abadi" panose="020B0604020104020204" pitchFamily="34" charset="0"/>
+              </a:rPr>
+              <a:t>Limitation: cannot predict games in weeks 1-3</a:t>
+            </a:r>
+          </a:p>
+          <a:p>
             <a:endParaRPr lang="en-US" dirty="0">
               <a:solidFill>
                 <a:srgbClr val="013369"/>
@@ -6207,10 +6257,6 @@
             </a:endParaRPr>
           </a:p>
           <a:p>
-            <a:pPr marL="285750" indent="-285750">
-              <a:buFont typeface="Arial" panose="020B0604020202020204" pitchFamily="34" charset="0"/>
-              <a:buChar char="•"/>
-            </a:pPr>
             <a:r>
               <a:rPr lang="en-US" dirty="0">
                 <a:solidFill>
@@ -6218,7 +6264,34 @@
                 </a:solidFill>
                 <a:latin typeface="Abadi" panose="020B0604020104020204" pitchFamily="34" charset="0"/>
               </a:rPr>
-              <a:t>Model requires 3 weeks of data before it can make a prediction</a:t>
+              <a:t>Test R</a:t>
+            </a:r>
+            <a:r>
+              <a:rPr lang="en-US" baseline="30000" dirty="0">
+                <a:solidFill>
+                  <a:srgbClr val="013369"/>
+                </a:solidFill>
+                <a:latin typeface="Abadi" panose="020B0604020104020204" pitchFamily="34" charset="0"/>
+              </a:rPr>
+              <a:t>2 </a:t>
+            </a:r>
+            <a:r>
+              <a:rPr lang="en-US" dirty="0">
+                <a:solidFill>
+                  <a:srgbClr val="013369"/>
+                </a:solidFill>
+                <a:latin typeface="Abadi" panose="020B0604020104020204" pitchFamily="34" charset="0"/>
+              </a:rPr>
+              <a:t>: </a:t>
+            </a:r>
+            <a:r>
+              <a:rPr lang="en-US" dirty="0">
+                <a:solidFill>
+                  <a:srgbClr val="D50A0A"/>
+                </a:solidFill>
+                <a:latin typeface="Abadi" panose="020B0604020104020204" pitchFamily="34" charset="0"/>
+              </a:rPr>
+              <a:t>0.151</a:t>
             </a:r>
           </a:p>
           <a:p>
@@ -6237,25 +6310,25 @@
                 </a:solidFill>
                 <a:latin typeface="Abadi" panose="020B0604020104020204" pitchFamily="34" charset="0"/>
               </a:rPr>
-              <a:t>Test R</a:t>
-            </a:r>
-            <a:r>
-              <a:rPr lang="en-US" baseline="30000" dirty="0">
+              <a:t>Predicted W/L outcome successfully </a:t>
+            </a:r>
+            <a:r>
+              <a:rPr lang="en-US" dirty="0">
+                <a:solidFill>
+                  <a:srgbClr val="D50A0A"/>
+                </a:solidFill>
+                <a:latin typeface="Abadi" panose="020B0604020104020204" pitchFamily="34" charset="0"/>
+              </a:rPr>
+              <a:t>64%</a:t>
+            </a:r>
+            <a:r>
+              <a:rPr lang="en-US" dirty="0">
                 <a:solidFill>
                   <a:srgbClr val="013369"/>
                 </a:solidFill>
                 <a:latin typeface="Abadi" panose="020B0604020104020204" pitchFamily="34" charset="0"/>
               </a:rPr>
-              <a:t>2 </a:t>
-            </a:r>
-            <a:r>
-              <a:rPr lang="en-US" dirty="0">
-                <a:solidFill>
-                  <a:srgbClr val="013369"/>
-                </a:solidFill>
-                <a:latin typeface="Abadi" panose="020B0604020104020204" pitchFamily="34" charset="0"/>
-              </a:rPr>
-              <a:t>: 0.151</a:t>
+              <a:t> of the time in test set</a:t>
             </a:r>
           </a:p>
           <a:p>
@@ -6289,25 +6362,7 @@
                 </a:solidFill>
                 <a:latin typeface="Abadi" panose="020B0604020104020204" pitchFamily="34" charset="0"/>
               </a:rPr>
-              <a:t>can expect margin to be within </a:t>
-            </a:r>
-            <a:r>
-              <a:rPr lang="en-US">
-                <a:solidFill>
-                  <a:srgbClr val="013369"/>
-                </a:solidFill>
-                <a:latin typeface="Abadi" panose="020B0604020104020204" pitchFamily="34" charset="0"/>
-              </a:rPr>
-              <a:t>13.58 pts </a:t>
-            </a:r>
-            <a:r>
-              <a:rPr lang="en-US" dirty="0">
-                <a:solidFill>
-                  <a:srgbClr val="013369"/>
-                </a:solidFill>
-                <a:latin typeface="Abadi" panose="020B0604020104020204" pitchFamily="34" charset="0"/>
-              </a:rPr>
-              <a:t>approximately 68% of the time, since the distribution of points margin is relatively normal </a:t>
+              <a:t>can expect margin to be within 13.58 pts approximately 68% of the time, since the distribution of points margin is relatively normal </a:t>
             </a:r>
           </a:p>
           <a:p>
@@ -6351,7 +6406,16 @@
                 </a:solidFill>
                 <a:latin typeface="Abadi" panose="020B0604020104020204" pitchFamily="34" charset="0"/>
               </a:rPr>
-              <a:t> : 0.118</a:t>
+              <a:t> : </a:t>
+            </a:r>
+            <a:r>
+              <a:rPr lang="en-US" dirty="0">
+                <a:solidFill>
+                  <a:srgbClr val="D50A0A"/>
+                </a:solidFill>
+                <a:latin typeface="Abadi" panose="020B0604020104020204" pitchFamily="34" charset="0"/>
+              </a:rPr>
+              <a:t>0.118</a:t>
             </a:r>
           </a:p>
           <a:p>
@@ -6511,7 +6575,7 @@
         <p:spPr>
           <a:xfrm>
             <a:off x="685800" y="1602769"/>
-            <a:ext cx="7168244" cy="4154984"/>
+            <a:ext cx="7168244" cy="6494085"/>
           </a:xfrm>
           <a:prstGeom prst="rect">
             <a:avLst/>
@@ -6529,7 +6593,7 @@
               <a:buChar char="•"/>
             </a:pPr>
             <a:r>
-              <a:rPr lang="en-US" dirty="0">
+              <a:rPr lang="en-US" sz="2000" dirty="0">
                 <a:solidFill>
                   <a:srgbClr val="013369"/>
                 </a:solidFill>
@@ -6544,7 +6608,7 @@
               <a:buChar char="•"/>
             </a:pPr>
             <a:r>
-              <a:rPr lang="en-US" dirty="0">
+              <a:rPr lang="en-US" sz="2000" dirty="0">
                 <a:solidFill>
                   <a:srgbClr val="013369"/>
                 </a:solidFill>
@@ -6558,7 +6622,7 @@
               <a:buFont typeface="Arial" panose="020B0604020202020204" pitchFamily="34" charset="0"/>
               <a:buChar char="•"/>
             </a:pPr>
-            <a:endParaRPr lang="en-US" dirty="0">
+            <a:endParaRPr lang="en-US" sz="2000" dirty="0">
               <a:solidFill>
                 <a:srgbClr val="013369"/>
               </a:solidFill>
@@ -6571,7 +6635,7 @@
               <a:buChar char="•"/>
             </a:pPr>
             <a:r>
-              <a:rPr lang="en-US" dirty="0">
+              <a:rPr lang="en-US" sz="2000" dirty="0">
                 <a:solidFill>
                   <a:srgbClr val="013369"/>
                 </a:solidFill>
@@ -6585,7 +6649,7 @@
               <a:buFont typeface="Arial" panose="020B0604020202020204" pitchFamily="34" charset="0"/>
               <a:buChar char="•"/>
             </a:pPr>
-            <a:endParaRPr lang="en-US" dirty="0">
+            <a:endParaRPr lang="en-US" sz="2000" dirty="0">
               <a:solidFill>
                 <a:srgbClr val="013369"/>
               </a:solidFill>
@@ -6598,13 +6662,67 @@
               <a:buChar char="•"/>
             </a:pPr>
             <a:r>
-              <a:rPr lang="en-US" dirty="0">
+              <a:rPr lang="en-US" sz="2000" dirty="0">
                 <a:solidFill>
                   <a:srgbClr val="013369"/>
                 </a:solidFill>
                 <a:latin typeface="Abadi" panose="020B0604020104020204" pitchFamily="34" charset="0"/>
               </a:rPr>
               <a:t>Incorporate team rankings in certain stat categories into algorithm</a:t>
+            </a:r>
+          </a:p>
+          <a:p>
+            <a:pPr marL="285750" indent="-285750">
+              <a:buFont typeface="Arial" panose="020B0604020202020204" pitchFamily="34" charset="0"/>
+              <a:buChar char="•"/>
+            </a:pPr>
+            <a:endParaRPr lang="en-US" sz="2000" dirty="0">
+              <a:solidFill>
+                <a:srgbClr val="013369"/>
+              </a:solidFill>
+              <a:latin typeface="Abadi" panose="020B0604020104020204" pitchFamily="34" charset="0"/>
+            </a:endParaRPr>
+          </a:p>
+          <a:p>
+            <a:pPr marL="285750" indent="-285750">
+              <a:buFont typeface="Arial" panose="020B0604020202020204" pitchFamily="34" charset="0"/>
+              <a:buChar char="•"/>
+            </a:pPr>
+            <a:r>
+              <a:rPr lang="en-US" sz="2000" dirty="0">
+                <a:solidFill>
+                  <a:srgbClr val="013369"/>
+                </a:solidFill>
+                <a:latin typeface="Abadi" panose="020B0604020104020204" pitchFamily="34" charset="0"/>
+              </a:rPr>
+              <a:t>Include features that indicate whether the team is at/near ”full strength” (i.e. injured QB, WR, star DE)</a:t>
+            </a:r>
+          </a:p>
+          <a:p>
+            <a:pPr marL="285750" indent="-285750">
+              <a:buFont typeface="Arial" panose="020B0604020202020204" pitchFamily="34" charset="0"/>
+              <a:buChar char="•"/>
+            </a:pPr>
+            <a:endParaRPr lang="en-US" sz="2000" dirty="0">
+              <a:solidFill>
+                <a:srgbClr val="013369"/>
+              </a:solidFill>
+              <a:latin typeface="Abadi" panose="020B0604020104020204" pitchFamily="34" charset="0"/>
+            </a:endParaRPr>
+          </a:p>
+          <a:p>
+            <a:pPr marL="285750" indent="-285750">
+              <a:buFont typeface="Arial" panose="020B0604020202020204" pitchFamily="34" charset="0"/>
+              <a:buChar char="•"/>
+            </a:pPr>
+            <a:r>
+              <a:rPr lang="en-US" sz="2000" dirty="0">
+                <a:solidFill>
+                  <a:srgbClr val="013369"/>
+                </a:solidFill>
+                <a:latin typeface="Abadi" panose="020B0604020104020204" pitchFamily="34" charset="0"/>
+              </a:rPr>
+              <a:t>Capture weather data during web-scraping process</a:t>
             </a:r>
           </a:p>
           <a:p>
@@ -6745,6 +6863,251 @@
     <p:extLst>
       <p:ext uri="{BB962C8B-B14F-4D97-AF65-F5344CB8AC3E}">
         <p14:creationId xmlns:p14="http://schemas.microsoft.com/office/powerpoint/2010/main" val="2994014578"/>
+      </p:ext>
+    </p:extLst>
+  </p:cSld>
+  <p:clrMapOvr>
+    <a:masterClrMapping/>
+  </p:clrMapOvr>
+</p:sld>
+</file>
+
+<file path=ppt/slides/slide8.xml><?xml version="1.0" encoding="utf-8"?>
+<p:sld xmlns:a="http://schemas.openxmlformats.org/drawingml/2006/main" xmlns:r="http://schemas.openxmlformats.org/officeDocument/2006/relationships" xmlns:p="http://schemas.openxmlformats.org/presentationml/2006/main">
+  <p:cSld>
+    <p:spTree>
+      <p:nvGrpSpPr>
+        <p:cNvPr id="1" name=""/>
+        <p:cNvGrpSpPr/>
+        <p:nvPr/>
+      </p:nvGrpSpPr>
+      <p:grpSpPr>
+        <a:xfrm>
+          <a:off x="0" y="0"/>
+          <a:ext cx="0" cy="0"/>
+          <a:chOff x="0" y="0"/>
+          <a:chExt cx="0" cy="0"/>
+        </a:xfrm>
+      </p:grpSpPr>
+      <p:sp>
+        <p:nvSpPr>
+          <p:cNvPr id="2" name="Title 1">
+            <a:extLst>
+              <a:ext uri="{FF2B5EF4-FFF2-40B4-BE49-F238E27FC236}">
+                <a16:creationId xmlns:a16="http://schemas.microsoft.com/office/drawing/2014/main" id="{68BBAB2C-EDF3-8345-B2A1-DAAF6EA5FDDB}"/>
+              </a:ext>
+            </a:extLst>
+          </p:cNvPr>
+          <p:cNvSpPr>
+            <a:spLocks noGrp="1"/>
+          </p:cNvSpPr>
+          <p:nvPr>
+            <p:ph type="title"/>
+          </p:nvPr>
+        </p:nvSpPr>
+        <p:spPr/>
+        <p:txBody>
+          <a:bodyPr/>
+          <a:lstStyle/>
+          <a:p>
+            <a:r>
+              <a:rPr lang="en-US" dirty="0">
+                <a:solidFill>
+                  <a:srgbClr val="D50A0A"/>
+                </a:solidFill>
+                <a:latin typeface="Abadi" panose="020B0604020104020204" pitchFamily="34" charset="0"/>
+              </a:rPr>
+              <a:t>Appendix</a:t>
+            </a:r>
+            <a:endParaRPr lang="en-US" dirty="0"/>
+          </a:p>
+        </p:txBody>
+      </p:sp>
+      <p:sp>
+        <p:nvSpPr>
+          <p:cNvPr id="3" name="Content Placeholder 2">
+            <a:extLst>
+              <a:ext uri="{FF2B5EF4-FFF2-40B4-BE49-F238E27FC236}">
+                <a16:creationId xmlns:a16="http://schemas.microsoft.com/office/drawing/2014/main" id="{49E1DB6A-EE9F-D744-8F23-E5E13470A670}"/>
+              </a:ext>
+            </a:extLst>
+          </p:cNvPr>
+          <p:cNvSpPr>
+            <a:spLocks noGrp="1"/>
+          </p:cNvSpPr>
+          <p:nvPr>
+            <p:ph idx="1"/>
+          </p:nvPr>
+        </p:nvSpPr>
+        <p:spPr/>
+        <p:txBody>
+          <a:bodyPr>
+            <a:normAutofit/>
+          </a:bodyPr>
+          <a:lstStyle/>
+          <a:p>
+            <a:r>
+              <a:rPr lang="en-US" sz="1800" dirty="0">
+                <a:solidFill>
+                  <a:srgbClr val="013369"/>
+                </a:solidFill>
+                <a:latin typeface="Abadi" panose="020B0604020104020204" pitchFamily="34" charset="0"/>
+              </a:rPr>
+              <a:t>Dataset</a:t>
+            </a:r>
+          </a:p>
+          <a:p>
+            <a:r>
+              <a:rPr lang="en-US" sz="1800" dirty="0">
+                <a:solidFill>
+                  <a:srgbClr val="013369"/>
+                </a:solidFill>
+                <a:latin typeface="Abadi" panose="020B0604020104020204" pitchFamily="34" charset="0"/>
+              </a:rPr>
+              <a:t>Data Gathering</a:t>
+            </a:r>
+          </a:p>
+          <a:p>
+            <a:pPr lvl="1"/>
+            <a:endParaRPr lang="en-US" sz="1400" dirty="0">
+              <a:solidFill>
+                <a:srgbClr val="013369"/>
+              </a:solidFill>
+              <a:latin typeface="Abadi" panose="020B0604020104020204" pitchFamily="34" charset="0"/>
+            </a:endParaRPr>
+          </a:p>
+          <a:p>
+            <a:r>
+              <a:rPr lang="en-US" sz="1800" dirty="0">
+                <a:solidFill>
+                  <a:srgbClr val="013369"/>
+                </a:solidFill>
+                <a:latin typeface="Abadi" panose="020B0604020104020204" pitchFamily="34" charset="0"/>
+              </a:rPr>
+              <a:t>Feature Engineering </a:t>
+            </a:r>
+          </a:p>
+          <a:p>
+            <a:pPr lvl="1"/>
+            <a:r>
+              <a:rPr lang="en-US" sz="1400" dirty="0">
+                <a:solidFill>
+                  <a:srgbClr val="013369"/>
+                </a:solidFill>
+                <a:latin typeface="Abadi" panose="020B0604020104020204" pitchFamily="34" charset="0"/>
+              </a:rPr>
+              <a:t>Home Game * EWMA Margin</a:t>
+            </a:r>
+          </a:p>
+          <a:p>
+            <a:pPr lvl="1"/>
+            <a:endParaRPr lang="en-US" sz="1400" dirty="0">
+              <a:solidFill>
+                <a:srgbClr val="013369"/>
+              </a:solidFill>
+              <a:latin typeface="Abadi" panose="020B0604020104020204" pitchFamily="34" charset="0"/>
+            </a:endParaRPr>
+          </a:p>
+        </p:txBody>
+      </p:sp>
+      <p:pic>
+        <p:nvPicPr>
+          <p:cNvPr id="1026" name="Picture 2">
+            <a:extLst>
+              <a:ext uri="{FF2B5EF4-FFF2-40B4-BE49-F238E27FC236}">
+                <a16:creationId xmlns:a16="http://schemas.microsoft.com/office/drawing/2014/main" id="{B1ED55DE-0197-F041-9CC8-ECEB9E526028}"/>
+              </a:ext>
+            </a:extLst>
+          </p:cNvPr>
+          <p:cNvPicPr>
+            <a:picLocks noChangeAspect="1" noChangeArrowheads="1"/>
+          </p:cNvPicPr>
+          <p:nvPr/>
+        </p:nvPicPr>
+        <p:blipFill>
+          <a:blip r:embed="rId2">
+            <a:extLst>
+              <a:ext uri="{28A0092B-C50C-407E-A947-70E740481C1C}">
+                <a14:useLocalDpi xmlns:a14="http://schemas.microsoft.com/office/drawing/2010/main" val="0"/>
+              </a:ext>
+            </a:extLst>
+          </a:blip>
+          <a:srcRect/>
+          <a:stretch>
+            <a:fillRect/>
+          </a:stretch>
+        </p:blipFill>
+        <p:spPr bwMode="auto">
+          <a:xfrm>
+            <a:off x="3825552" y="3186486"/>
+            <a:ext cx="3682338" cy="3474340"/>
+          </a:xfrm>
+          <a:prstGeom prst="rect">
+            <a:avLst/>
+          </a:prstGeom>
+          <a:noFill/>
+          <a:extLst>
+            <a:ext uri="{909E8E84-426E-40DD-AFC4-6F175D3DCCD1}">
+              <a14:hiddenFill xmlns:a14="http://schemas.microsoft.com/office/drawing/2010/main">
+                <a:solidFill>
+                  <a:srgbClr val="FFFFFF"/>
+                </a:solidFill>
+              </a14:hiddenFill>
+            </a:ext>
+          </a:extLst>
+        </p:spPr>
+      </p:pic>
+      <p:pic>
+        <p:nvPicPr>
+          <p:cNvPr id="1028" name="Picture 4">
+            <a:extLst>
+              <a:ext uri="{FF2B5EF4-FFF2-40B4-BE49-F238E27FC236}">
+                <a16:creationId xmlns:a16="http://schemas.microsoft.com/office/drawing/2014/main" id="{8562597D-16D3-1241-9928-F3782E4A6433}"/>
+              </a:ext>
+            </a:extLst>
+          </p:cNvPr>
+          <p:cNvPicPr>
+            <a:picLocks noChangeAspect="1" noChangeArrowheads="1"/>
+          </p:cNvPicPr>
+          <p:nvPr/>
+        </p:nvPicPr>
+        <p:blipFill>
+          <a:blip r:embed="rId3">
+            <a:extLst>
+              <a:ext uri="{28A0092B-C50C-407E-A947-70E740481C1C}">
+                <a14:useLocalDpi xmlns:a14="http://schemas.microsoft.com/office/drawing/2010/main" val="0"/>
+              </a:ext>
+            </a:extLst>
+          </a:blip>
+          <a:srcRect/>
+          <a:stretch>
+            <a:fillRect/>
+          </a:stretch>
+        </p:blipFill>
+        <p:spPr bwMode="auto">
+          <a:xfrm>
+            <a:off x="7753248" y="3186486"/>
+            <a:ext cx="3682338" cy="3474340"/>
+          </a:xfrm>
+          <a:prstGeom prst="rect">
+            <a:avLst/>
+          </a:prstGeom>
+          <a:noFill/>
+          <a:extLst>
+            <a:ext uri="{909E8E84-426E-40DD-AFC4-6F175D3DCCD1}">
+              <a14:hiddenFill xmlns:a14="http://schemas.microsoft.com/office/drawing/2010/main">
+                <a:solidFill>
+                  <a:srgbClr val="FFFFFF"/>
+                </a:solidFill>
+              </a14:hiddenFill>
+            </a:ext>
+          </a:extLst>
+        </p:spPr>
+      </p:pic>
+    </p:spTree>
+    <p:extLst>
+      <p:ext uri="{BB962C8B-B14F-4D97-AF65-F5344CB8AC3E}">
+        <p14:creationId xmlns:p14="http://schemas.microsoft.com/office/powerpoint/2010/main" val="2217103036"/>
       </p:ext>
     </p:extLst>
   </p:cSld>

</xml_diff>